<commit_message>
Changes to the readme and Final presentation..
</commit_message>
<xml_diff>
--- a/Presentation/Case_Study_Beers_FINAL.pptx
+++ b/Presentation/Case_Study_Beers_FINAL.pptx
@@ -14065,7 +14065,7 @@
         </p:spPr>
         <p:txBody>
           <a:bodyPr>
-            <a:normAutofit fontScale="62500" lnSpcReduction="20000"/>
+            <a:noAutofit/>
           </a:bodyPr>
           <a:lstStyle/>
           <a:p>
@@ -14073,17 +14073,17 @@
               <a:buNone/>
             </a:pPr>
             <a:r>
-              <a:rPr lang="en-ZA" dirty="0"/>
+              <a:rPr lang="en-ZA" sz="1800" dirty="0"/>
               <a:t>The purpose of this document is to provide a detailed view about the beers crafted in United States of America</a:t>
             </a:r>
             <a:r>
-              <a:rPr lang="en-ZA" noProof="1"/>
+              <a:rPr lang="en-ZA" sz="1800" noProof="1"/>
               <a:t>.  After a thorough review of the data, a suggested location for opening a new brewery is to be provided.</a:t>
             </a:r>
-            <a:endParaRPr lang="en-ZA" dirty="0"/>
-          </a:p>
-          <a:p>
-            <a:endParaRPr lang="en-ZA" dirty="0"/>
+            <a:endParaRPr lang="en-ZA" sz="1800" dirty="0"/>
+          </a:p>
+          <a:p>
+            <a:endParaRPr lang="en-ZA" sz="1800" dirty="0"/>
           </a:p>
         </p:txBody>
       </p:sp>
@@ -14103,7 +14103,7 @@
         </p:nvSpPr>
         <p:spPr>
           <a:xfrm>
-            <a:off x="443388" y="2392196"/>
+            <a:off x="443388" y="2897098"/>
             <a:ext cx="3041684" cy="2845804"/>
           </a:xfrm>
           <a:prstGeom prst="rect">
@@ -14342,7 +14342,7 @@
         </p:nvSpPr>
         <p:spPr>
           <a:xfrm>
-            <a:off x="3937085" y="2392196"/>
+            <a:off x="3958987" y="2902444"/>
             <a:ext cx="3041684" cy="1927804"/>
           </a:xfrm>
           <a:prstGeom prst="rect">

</xml_diff>

<commit_message>
Final Presentation Upload. -TL
</commit_message>
<xml_diff>
--- a/Presentation/Case_Study_Beers_FINAL.pptx
+++ b/Presentation/Case_Study_Beers_FINAL.pptx
@@ -13422,8 +13422,8 @@
           </a:p>
         </p:txBody>
       </p:sp>
-      <mc:AlternateContent xmlns:mc="http://schemas.openxmlformats.org/markup-compatibility/2006" xmlns:a14="http://schemas.microsoft.com/office/drawing/2010/main">
-        <mc:Choice Requires="a14">
+      <mc:AlternateContent xmlns:mc="http://schemas.openxmlformats.org/markup-compatibility/2006">
+        <mc:Choice xmlns:a14="http://schemas.microsoft.com/office/drawing/2010/main" Requires="a14">
           <p:sp>
             <p:nvSpPr>
               <p:cNvPr id="5" name="TextBox 4">
@@ -13439,7 +13439,7 @@
             <p:spPr>
               <a:xfrm>
                 <a:off x="360000" y="1259175"/>
-                <a:ext cx="3924406" cy="3170099"/>
+                <a:ext cx="3924406" cy="3447098"/>
               </a:xfrm>
               <a:prstGeom prst="rect">
                 <a:avLst/>
@@ -13560,13 +13560,13 @@
                 </a:pPr>
                 <a:r>
                   <a:rPr lang="en-US" dirty="0"/>
-                  <a:t>Exact inference can be drawn only after a causal study on the beers.</a:t>
+                  <a:t>Exact inference can be drawn only after a causal study on the beers’ values.</a:t>
                 </a:r>
               </a:p>
             </p:txBody>
           </p:sp>
         </mc:Choice>
-        <mc:Fallback xmlns="">
+        <mc:Fallback>
           <p:sp>
             <p:nvSpPr>
               <p:cNvPr id="5" name="TextBox 4">
@@ -13584,7 +13584,7 @@
             <p:spPr>
               <a:xfrm>
                 <a:off x="360000" y="1259175"/>
-                <a:ext cx="3924406" cy="3170099"/>
+                <a:ext cx="3924406" cy="3447098"/>
               </a:xfrm>
               <a:prstGeom prst="rect">
                 <a:avLst/>
@@ -13592,7 +13592,7 @@
               <a:blipFill>
                 <a:blip r:embed="rId2"/>
                 <a:stretch>
-                  <a:fillRect l="-932" t="-1154" r="-2484" b="-2115"/>
+                  <a:fillRect l="-932" t="-1062" r="-2484" b="-1947"/>
                 </a:stretch>
               </a:blipFill>
             </p:spPr>
@@ -13751,36 +13751,6 @@
           </a:p>
         </p:txBody>
       </p:sp>
-      <p:pic>
-        <p:nvPicPr>
-          <p:cNvPr id="6" name="Picture 5">
-            <a:extLst>
-              <a:ext uri="{FF2B5EF4-FFF2-40B4-BE49-F238E27FC236}">
-                <a16:creationId xmlns:a16="http://schemas.microsoft.com/office/drawing/2014/main" id="{0467622B-F8C6-42B0-92AA-E145D4CA5BCF}"/>
-              </a:ext>
-            </a:extLst>
-          </p:cNvPr>
-          <p:cNvPicPr>
-            <a:picLocks noChangeAspect="1"/>
-          </p:cNvPicPr>
-          <p:nvPr/>
-        </p:nvPicPr>
-        <p:blipFill>
-          <a:blip r:embed="rId2"/>
-          <a:stretch>
-            <a:fillRect/>
-          </a:stretch>
-        </p:blipFill>
-        <p:spPr>
-          <a:xfrm>
-            <a:off x="4706854" y="1064544"/>
-            <a:ext cx="7181850" cy="5210175"/>
-          </a:xfrm>
-          <a:prstGeom prst="rect">
-            <a:avLst/>
-          </a:prstGeom>
-        </p:spPr>
-      </p:pic>
       <p:sp>
         <p:nvSpPr>
           <p:cNvPr id="7" name="TextBox 6">
@@ -13825,6 +13795,108 @@
           </a:p>
           <a:p>
             <a:endParaRPr lang="en-US" dirty="0"/>
+          </a:p>
+        </p:txBody>
+      </p:sp>
+      <p:pic>
+        <p:nvPicPr>
+          <p:cNvPr id="3" name="Picture 2">
+            <a:extLst>
+              <a:ext uri="{FF2B5EF4-FFF2-40B4-BE49-F238E27FC236}">
+                <a16:creationId xmlns:a16="http://schemas.microsoft.com/office/drawing/2014/main" id="{CD29CFEE-7F57-41C1-87CB-D547B312F0E5}"/>
+              </a:ext>
+            </a:extLst>
+          </p:cNvPr>
+          <p:cNvPicPr>
+            <a:picLocks noChangeAspect="1"/>
+          </p:cNvPicPr>
+          <p:nvPr/>
+        </p:nvPicPr>
+        <p:blipFill>
+          <a:blip r:embed="rId2"/>
+          <a:stretch>
+            <a:fillRect/>
+          </a:stretch>
+        </p:blipFill>
+        <p:spPr>
+          <a:xfrm>
+            <a:off x="4697597" y="1239837"/>
+            <a:ext cx="7219950" cy="5257800"/>
+          </a:xfrm>
+          <a:prstGeom prst="rect">
+            <a:avLst/>
+          </a:prstGeom>
+        </p:spPr>
+      </p:pic>
+      <p:sp>
+        <p:nvSpPr>
+          <p:cNvPr id="5" name="TextBox 4">
+            <a:extLst>
+              <a:ext uri="{FF2B5EF4-FFF2-40B4-BE49-F238E27FC236}">
+                <a16:creationId xmlns:a16="http://schemas.microsoft.com/office/drawing/2014/main" id="{E47B7FEE-3DC2-4BC6-B643-6163CA18916B}"/>
+              </a:ext>
+            </a:extLst>
+          </p:cNvPr>
+          <p:cNvSpPr txBox="1"/>
+          <p:nvPr/>
+        </p:nvSpPr>
+        <p:spPr>
+          <a:xfrm>
+            <a:off x="5943599" y="1311442"/>
+            <a:ext cx="4419287" cy="369332"/>
+          </a:xfrm>
+          <a:prstGeom prst="rect">
+            <a:avLst/>
+          </a:prstGeom>
+          <a:solidFill>
+            <a:schemeClr val="bg1"/>
+          </a:solidFill>
+        </p:spPr>
+        <p:txBody>
+          <a:bodyPr wrap="none" rtlCol="0">
+            <a:spAutoFit/>
+          </a:bodyPr>
+          <a:lstStyle/>
+          <a:p>
+            <a:r>
+              <a:rPr lang="en-US" dirty="0"/>
+              <a:t>Best Potential Locations for New Breweries</a:t>
+            </a:r>
+          </a:p>
+        </p:txBody>
+      </p:sp>
+      <p:sp>
+        <p:nvSpPr>
+          <p:cNvPr id="8" name="TextBox 7">
+            <a:extLst>
+              <a:ext uri="{FF2B5EF4-FFF2-40B4-BE49-F238E27FC236}">
+                <a16:creationId xmlns:a16="http://schemas.microsoft.com/office/drawing/2014/main" id="{294160BA-6E37-427D-8C4D-3B83FFB89C03}"/>
+              </a:ext>
+            </a:extLst>
+          </p:cNvPr>
+          <p:cNvSpPr txBox="1"/>
+          <p:nvPr/>
+        </p:nvSpPr>
+        <p:spPr>
+          <a:xfrm>
+            <a:off x="4697597" y="6189860"/>
+            <a:ext cx="6103915" cy="307777"/>
+          </a:xfrm>
+          <a:prstGeom prst="rect">
+            <a:avLst/>
+          </a:prstGeom>
+          <a:noFill/>
+        </p:spPr>
+        <p:txBody>
+          <a:bodyPr wrap="none" rtlCol="0">
+            <a:spAutoFit/>
+          </a:bodyPr>
+          <a:lstStyle/>
+          <a:p>
+            <a:r>
+              <a:rPr lang="en-US" sz="1400" dirty="0"/>
+              <a:t>Score = 100 – (current state qty of breweries + adjacent state qty of breweries)</a:t>
+            </a:r>
           </a:p>
         </p:txBody>
       </p:sp>

</xml_diff>

<commit_message>
Updated with more deteails
</commit_message>
<xml_diff>
--- a/Presentation/Case_Study_Beers_FINAL.pptx
+++ b/Presentation/Case_Study_Beers_FINAL.pptx
@@ -4424,7 +4424,7 @@
           <a:p>
             <a:fld id="{BC69C520-1686-49C0-8B4B-E5082C57E0DE}" type="datetimeFigureOut">
               <a:rPr lang="en-US" smtClean="0"/>
-              <a:t>10/14/2018</a:t>
+              <a:t>10/16/2018</a:t>
             </a:fld>
             <a:endParaRPr lang="en-US"/>
           </a:p>
@@ -4601,7 +4601,7 @@
           <a:p>
             <a:fld id="{EF1A1128-5E2C-4243-BC59-8BD96BECC647}" type="datetimeFigureOut">
               <a:rPr lang="en-US" smtClean="0"/>
-              <a:t>10/14/2018</a:t>
+              <a:t>10/16/2018</a:t>
             </a:fld>
             <a:endParaRPr lang="en-US"/>
           </a:p>
@@ -12130,7 +12130,7 @@
           <a:p>
             <a:r>
               <a:rPr lang="en-US" dirty="0"/>
-              <a:t>Median ABV for each state.</a:t>
+              <a:t>Median IBU for each state.</a:t>
             </a:r>
           </a:p>
         </p:txBody>
@@ -12150,14 +12150,14 @@
           <p:nvPr>
             <p:extLst>
               <p:ext uri="{D42A27DB-BD31-4B8C-83A1-F6EECF244321}">
-                <p14:modId xmlns:p14="http://schemas.microsoft.com/office/powerpoint/2010/main" val="2676580433"/>
+                <p14:modId xmlns:p14="http://schemas.microsoft.com/office/powerpoint/2010/main" val="2054669441"/>
               </p:ext>
             </p:extLst>
           </p:nvPr>
         </p:nvGraphicFramePr>
         <p:xfrm>
-          <a:off x="418871" y="609600"/>
-          <a:ext cx="11343610" cy="5671804"/>
+          <a:off x="418871" y="2655592"/>
+          <a:ext cx="11343610" cy="3625811"/>
         </p:xfrm>
         <a:graphic>
           <a:graphicData uri="http://schemas.openxmlformats.org/drawingml/2006/chart">
@@ -12165,6 +12165,41 @@
           </a:graphicData>
         </a:graphic>
       </p:graphicFrame>
+      <p:sp>
+        <p:nvSpPr>
+          <p:cNvPr id="4" name="TextBox 3">
+            <a:extLst>
+              <a:ext uri="{FF2B5EF4-FFF2-40B4-BE49-F238E27FC236}">
+                <a16:creationId xmlns:a16="http://schemas.microsoft.com/office/drawing/2014/main" id="{147050D5-952F-4EC9-8821-428CD9690192}"/>
+              </a:ext>
+            </a:extLst>
+          </p:cNvPr>
+          <p:cNvSpPr txBox="1"/>
+          <p:nvPr/>
+        </p:nvSpPr>
+        <p:spPr>
+          <a:xfrm>
+            <a:off x="544446" y="1580050"/>
+            <a:ext cx="10973298" cy="646331"/>
+          </a:xfrm>
+          <a:prstGeom prst="rect">
+            <a:avLst/>
+          </a:prstGeom>
+          <a:noFill/>
+        </p:spPr>
+        <p:txBody>
+          <a:bodyPr wrap="square" rtlCol="0">
+            <a:spAutoFit/>
+          </a:bodyPr>
+          <a:lstStyle/>
+          <a:p>
+            <a:r>
+              <a:rPr lang="en-US" dirty="0"/>
+              <a:t>Median International Bitterness Units helps US Beer crafters to decide the bitterness taste choices by the users in the respective regions.</a:t>
+            </a:r>
+          </a:p>
+        </p:txBody>
+      </p:sp>
     </p:spTree>
     <p:extLst>
       <p:ext uri="{BB962C8B-B14F-4D97-AF65-F5344CB8AC3E}">
@@ -13422,8 +13457,8 @@
           </a:p>
         </p:txBody>
       </p:sp>
-      <mc:AlternateContent xmlns:mc="http://schemas.openxmlformats.org/markup-compatibility/2006">
-        <mc:Choice xmlns:a14="http://schemas.microsoft.com/office/drawing/2010/main" Requires="a14">
+      <mc:AlternateContent xmlns:mc="http://schemas.openxmlformats.org/markup-compatibility/2006" xmlns:a14="http://schemas.microsoft.com/office/drawing/2010/main">
+        <mc:Choice Requires="a14">
           <p:sp>
             <p:nvSpPr>
               <p:cNvPr id="5" name="TextBox 4">
@@ -13566,7 +13601,7 @@
             </p:txBody>
           </p:sp>
         </mc:Choice>
-        <mc:Fallback>
+        <mc:Fallback xmlns="">
           <p:sp>
             <p:nvSpPr>
               <p:cNvPr id="5" name="TextBox 4">
@@ -14106,10 +14141,10 @@
           <a:lstStyle/>
           <a:p>
             <a:r>
-              <a:rPr lang="en-ZA" dirty="0"/>
-              <a:t>Beer Study</a:t>
-            </a:r>
-            <a:endParaRPr lang="en-ZA" noProof="1"/>
+              <a:rPr lang="en-ZA" b="1" dirty="0"/>
+              <a:t>Purpose</a:t>
+            </a:r>
+            <a:endParaRPr lang="en-ZA" b="1" noProof="1"/>
           </a:p>
         </p:txBody>
       </p:sp>
@@ -14145,17 +14180,17 @@
               <a:buNone/>
             </a:pPr>
             <a:r>
-              <a:rPr lang="en-ZA" sz="1800" dirty="0"/>
+              <a:rPr lang="en-ZA" sz="1600" dirty="0"/>
               <a:t>The purpose of this document is to provide a detailed view about the beers crafted in United States of America</a:t>
             </a:r>
             <a:r>
-              <a:rPr lang="en-ZA" sz="1800" noProof="1"/>
+              <a:rPr lang="en-ZA" sz="1600" noProof="1"/>
               <a:t>.  After a thorough review of the data, a suggested location for opening a new brewery is to be provided.</a:t>
             </a:r>
-            <a:endParaRPr lang="en-ZA" sz="1800" dirty="0"/>
-          </a:p>
-          <a:p>
-            <a:endParaRPr lang="en-ZA" sz="1800" dirty="0"/>
+            <a:endParaRPr lang="en-ZA" sz="1600" dirty="0"/>
+          </a:p>
+          <a:p>
+            <a:endParaRPr lang="en-ZA" sz="1600" dirty="0"/>
           </a:p>
         </p:txBody>
       </p:sp>
@@ -14175,8 +14210,8 @@
         </p:nvSpPr>
         <p:spPr>
           <a:xfrm>
-            <a:off x="443388" y="2897098"/>
-            <a:ext cx="3041684" cy="2845804"/>
+            <a:off x="454909" y="4266394"/>
+            <a:ext cx="3041684" cy="2206021"/>
           </a:xfrm>
           <a:prstGeom prst="rect">
             <a:avLst/>
@@ -14370,29 +14405,29 @@
               <a:buNone/>
             </a:pPr>
             <a:r>
-              <a:rPr lang="en-ZA" dirty="0"/>
+              <a:rPr lang="en-ZA" sz="1400" dirty="0"/>
               <a:t>Beers</a:t>
             </a:r>
           </a:p>
           <a:p>
             <a:r>
-              <a:rPr lang="en-ZA" dirty="0"/>
+              <a:rPr lang="en-ZA" sz="1400" dirty="0"/>
               <a:t>Identified 2305 unique Beer names out of 2410 beers records</a:t>
             </a:r>
           </a:p>
           <a:p>
             <a:r>
-              <a:rPr lang="en-ZA" dirty="0"/>
+              <a:rPr lang="en-ZA" sz="1400" dirty="0"/>
               <a:t>2.57% missing information about </a:t>
             </a:r>
             <a:r>
-              <a:rPr lang="en-US" dirty="0"/>
+              <a:rPr lang="en-US" sz="1400" dirty="0"/>
               <a:t>Alcohol by volume of the beer (ABV).</a:t>
             </a:r>
           </a:p>
           <a:p>
             <a:r>
-              <a:rPr lang="en-US" dirty="0"/>
+              <a:rPr lang="en-US" sz="1400" dirty="0"/>
               <a:t>41.7% missing information on International Bitterness Units of the beer (IBU)</a:t>
             </a:r>
           </a:p>
@@ -14414,8 +14449,8 @@
         </p:nvSpPr>
         <p:spPr>
           <a:xfrm>
-            <a:off x="3958987" y="2902444"/>
-            <a:ext cx="3041684" cy="1927804"/>
+            <a:off x="3970507" y="4271740"/>
+            <a:ext cx="3393949" cy="1735261"/>
           </a:xfrm>
           <a:prstGeom prst="rect">
             <a:avLst/>
@@ -14609,28 +14644,28 @@
               <a:buNone/>
             </a:pPr>
             <a:r>
-              <a:rPr lang="en-ZA" dirty="0"/>
+              <a:rPr lang="en-ZA" sz="1400" dirty="0"/>
               <a:t>Breweries</a:t>
             </a:r>
           </a:p>
           <a:p>
             <a:r>
-              <a:rPr lang="en-ZA" dirty="0"/>
+              <a:rPr lang="en-ZA" sz="1400" dirty="0"/>
               <a:t>Identified </a:t>
             </a:r>
             <a:r>
-              <a:rPr lang="en-US" dirty="0"/>
+              <a:rPr lang="en-US" sz="1400" dirty="0"/>
               <a:t>551 unique Brewery names out of 558 Brewery records</a:t>
             </a:r>
           </a:p>
           <a:p>
             <a:r>
-              <a:rPr lang="en-US" dirty="0"/>
+              <a:rPr lang="en-US" sz="1400" dirty="0"/>
               <a:t>All there breweries were distributed to 384 cities</a:t>
             </a:r>
           </a:p>
           <a:p>
-            <a:endParaRPr lang="en-ZA" dirty="0"/>
+            <a:endParaRPr lang="en-ZA" sz="1400" dirty="0"/>
           </a:p>
         </p:txBody>
       </p:sp>
@@ -14718,6 +14753,1096 @@
               <a:rPr lang="en-US" sz="700" dirty="0"/>
               <a:t>https://b-i.forbesimg.com/ups/files/2013/07/beer-mug.jpg</a:t>
             </a:r>
+          </a:p>
+        </p:txBody>
+      </p:sp>
+      <p:sp>
+        <p:nvSpPr>
+          <p:cNvPr id="10" name="Content Placeholder 3">
+            <a:extLst>
+              <a:ext uri="{FF2B5EF4-FFF2-40B4-BE49-F238E27FC236}">
+                <a16:creationId xmlns:a16="http://schemas.microsoft.com/office/drawing/2014/main" id="{57699743-C1A9-46CA-A735-A4096B32FB7B}"/>
+              </a:ext>
+            </a:extLst>
+          </p:cNvPr>
+          <p:cNvSpPr txBox="1">
+            <a:spLocks/>
+          </p:cNvSpPr>
+          <p:nvPr/>
+        </p:nvSpPr>
+        <p:spPr>
+          <a:xfrm>
+            <a:off x="360000" y="2590000"/>
+            <a:ext cx="2290117" cy="290086"/>
+          </a:xfrm>
+          <a:prstGeom prst="rect">
+            <a:avLst/>
+          </a:prstGeom>
+        </p:spPr>
+        <p:txBody>
+          <a:bodyPr vert="horz" lIns="0" tIns="0" rIns="0" bIns="0" rtlCol="0">
+            <a:noAutofit/>
+          </a:bodyPr>
+          <a:lstStyle>
+            <a:lvl1pPr marL="263525" indent="-263525" algn="l" defTabSz="914400" rtl="0" eaLnBrk="1" latinLnBrk="0" hangingPunct="1">
+              <a:lnSpc>
+                <a:spcPct val="90000"/>
+              </a:lnSpc>
+              <a:spcBef>
+                <a:spcPts val="1000"/>
+              </a:spcBef>
+              <a:buFont typeface="Arial" panose="020B0604020202020204" pitchFamily="34" charset="0"/>
+              <a:buChar char="•"/>
+              <a:defRPr sz="1800" kern="1200">
+                <a:solidFill>
+                  <a:schemeClr val="tx1">
+                    <a:lumMod val="75000"/>
+                    <a:lumOff val="25000"/>
+                  </a:schemeClr>
+                </a:solidFill>
+                <a:latin typeface="+mj-lt"/>
+                <a:ea typeface="+mn-ea"/>
+                <a:cs typeface="+mn-cs"/>
+              </a:defRPr>
+            </a:lvl1pPr>
+            <a:lvl2pPr marL="536575" indent="-273050" algn="l" defTabSz="914400" rtl="0" eaLnBrk="1" latinLnBrk="0" hangingPunct="1">
+              <a:lnSpc>
+                <a:spcPct val="90000"/>
+              </a:lnSpc>
+              <a:spcBef>
+                <a:spcPts val="500"/>
+              </a:spcBef>
+              <a:buFont typeface="Arial" panose="020B0604020202020204" pitchFamily="34" charset="0"/>
+              <a:buChar char="•"/>
+              <a:defRPr sz="1600" kern="1200">
+                <a:solidFill>
+                  <a:schemeClr val="tx1">
+                    <a:lumMod val="75000"/>
+                    <a:lumOff val="25000"/>
+                  </a:schemeClr>
+                </a:solidFill>
+                <a:latin typeface="+mj-lt"/>
+                <a:ea typeface="+mn-ea"/>
+                <a:cs typeface="+mn-cs"/>
+              </a:defRPr>
+            </a:lvl2pPr>
+            <a:lvl3pPr marL="811213" indent="-274638" algn="l" defTabSz="914400" rtl="0" eaLnBrk="1" latinLnBrk="0" hangingPunct="1">
+              <a:lnSpc>
+                <a:spcPct val="90000"/>
+              </a:lnSpc>
+              <a:spcBef>
+                <a:spcPts val="500"/>
+              </a:spcBef>
+              <a:buFont typeface="Arial" panose="020B0604020202020204" pitchFamily="34" charset="0"/>
+              <a:buChar char="•"/>
+              <a:defRPr sz="1400" kern="1200">
+                <a:solidFill>
+                  <a:schemeClr val="tx1">
+                    <a:lumMod val="75000"/>
+                    <a:lumOff val="25000"/>
+                  </a:schemeClr>
+                </a:solidFill>
+                <a:latin typeface="+mj-lt"/>
+                <a:ea typeface="+mn-ea"/>
+                <a:cs typeface="+mn-cs"/>
+              </a:defRPr>
+            </a:lvl3pPr>
+            <a:lvl4pPr marL="1074738" indent="-263525" algn="l" defTabSz="914400" rtl="0" eaLnBrk="1" latinLnBrk="0" hangingPunct="1">
+              <a:lnSpc>
+                <a:spcPct val="90000"/>
+              </a:lnSpc>
+              <a:spcBef>
+                <a:spcPts val="500"/>
+              </a:spcBef>
+              <a:buFont typeface="Arial" panose="020B0604020202020204" pitchFamily="34" charset="0"/>
+              <a:buChar char="•"/>
+              <a:defRPr sz="1400" kern="1200">
+                <a:solidFill>
+                  <a:schemeClr val="tx1">
+                    <a:lumMod val="75000"/>
+                    <a:lumOff val="25000"/>
+                  </a:schemeClr>
+                </a:solidFill>
+                <a:latin typeface="+mj-lt"/>
+                <a:ea typeface="+mn-ea"/>
+                <a:cs typeface="+mn-cs"/>
+              </a:defRPr>
+            </a:lvl4pPr>
+            <a:lvl5pPr marL="1347788" indent="-273050" algn="l" defTabSz="914400" rtl="0" eaLnBrk="1" latinLnBrk="0" hangingPunct="1">
+              <a:lnSpc>
+                <a:spcPct val="90000"/>
+              </a:lnSpc>
+              <a:spcBef>
+                <a:spcPts val="500"/>
+              </a:spcBef>
+              <a:buFont typeface="Arial" panose="020B0604020202020204" pitchFamily="34" charset="0"/>
+              <a:buChar char="•"/>
+              <a:defRPr sz="1400" kern="1200">
+                <a:solidFill>
+                  <a:schemeClr val="tx1">
+                    <a:lumMod val="75000"/>
+                    <a:lumOff val="25000"/>
+                  </a:schemeClr>
+                </a:solidFill>
+                <a:latin typeface="+mj-lt"/>
+                <a:ea typeface="+mn-ea"/>
+                <a:cs typeface="+mn-cs"/>
+              </a:defRPr>
+            </a:lvl5pPr>
+            <a:lvl6pPr marL="2514600" indent="-228600" algn="l" defTabSz="914400" rtl="0" eaLnBrk="1" latinLnBrk="0" hangingPunct="1">
+              <a:lnSpc>
+                <a:spcPct val="90000"/>
+              </a:lnSpc>
+              <a:spcBef>
+                <a:spcPts val="500"/>
+              </a:spcBef>
+              <a:buFont typeface="Arial" panose="020B0604020202020204" pitchFamily="34" charset="0"/>
+              <a:buChar char="•"/>
+              <a:defRPr sz="1800" kern="1200">
+                <a:solidFill>
+                  <a:schemeClr val="tx1"/>
+                </a:solidFill>
+                <a:latin typeface="+mn-lt"/>
+                <a:ea typeface="+mn-ea"/>
+                <a:cs typeface="+mn-cs"/>
+              </a:defRPr>
+            </a:lvl6pPr>
+            <a:lvl7pPr marL="2971800" indent="-228600" algn="l" defTabSz="914400" rtl="0" eaLnBrk="1" latinLnBrk="0" hangingPunct="1">
+              <a:lnSpc>
+                <a:spcPct val="90000"/>
+              </a:lnSpc>
+              <a:spcBef>
+                <a:spcPts val="500"/>
+              </a:spcBef>
+              <a:buFont typeface="Arial" panose="020B0604020202020204" pitchFamily="34" charset="0"/>
+              <a:buChar char="•"/>
+              <a:defRPr sz="1800" kern="1200">
+                <a:solidFill>
+                  <a:schemeClr val="tx1"/>
+                </a:solidFill>
+                <a:latin typeface="+mn-lt"/>
+                <a:ea typeface="+mn-ea"/>
+                <a:cs typeface="+mn-cs"/>
+              </a:defRPr>
+            </a:lvl7pPr>
+            <a:lvl8pPr marL="3429000" indent="-228600" algn="l" defTabSz="914400" rtl="0" eaLnBrk="1" latinLnBrk="0" hangingPunct="1">
+              <a:lnSpc>
+                <a:spcPct val="90000"/>
+              </a:lnSpc>
+              <a:spcBef>
+                <a:spcPts val="500"/>
+              </a:spcBef>
+              <a:buFont typeface="Arial" panose="020B0604020202020204" pitchFamily="34" charset="0"/>
+              <a:buChar char="•"/>
+              <a:defRPr sz="1800" kern="1200">
+                <a:solidFill>
+                  <a:schemeClr val="tx1"/>
+                </a:solidFill>
+                <a:latin typeface="+mn-lt"/>
+                <a:ea typeface="+mn-ea"/>
+                <a:cs typeface="+mn-cs"/>
+              </a:defRPr>
+            </a:lvl8pPr>
+            <a:lvl9pPr marL="3886200" indent="-228600" algn="l" defTabSz="914400" rtl="0" eaLnBrk="1" latinLnBrk="0" hangingPunct="1">
+              <a:lnSpc>
+                <a:spcPct val="90000"/>
+              </a:lnSpc>
+              <a:spcBef>
+                <a:spcPts val="500"/>
+              </a:spcBef>
+              <a:buFont typeface="Arial" panose="020B0604020202020204" pitchFamily="34" charset="0"/>
+              <a:buChar char="•"/>
+              <a:defRPr sz="1800" kern="1200">
+                <a:solidFill>
+                  <a:schemeClr val="tx1"/>
+                </a:solidFill>
+                <a:latin typeface="+mn-lt"/>
+                <a:ea typeface="+mn-ea"/>
+                <a:cs typeface="+mn-cs"/>
+              </a:defRPr>
+            </a:lvl9pPr>
+          </a:lstStyle>
+          <a:p>
+            <a:pPr marL="0" indent="0">
+              <a:buNone/>
+            </a:pPr>
+            <a:r>
+              <a:rPr lang="en-US" sz="1400" b="1" u="sng" dirty="0"/>
+              <a:t>Client</a:t>
+            </a:r>
+            <a:r>
+              <a:rPr lang="en-US" sz="1400" dirty="0"/>
+              <a:t>: US </a:t>
+            </a:r>
+            <a:r>
+              <a:rPr lang="en-US" sz="1600" dirty="0">
+                <a:ln>
+                  <a:solidFill>
+                    <a:schemeClr val="bg1">
+                      <a:lumMod val="75000"/>
+                      <a:lumOff val="25000"/>
+                      <a:alpha val="10000"/>
+                    </a:schemeClr>
+                  </a:solidFill>
+                </a:ln>
+                <a:solidFill>
+                  <a:schemeClr val="tx2"/>
+                </a:solidFill>
+                <a:effectLst>
+                  <a:outerShdw blurRad="9525" dist="25400" dir="14640000" algn="tl" rotWithShape="0">
+                    <a:schemeClr val="bg1">
+                      <a:alpha val="30000"/>
+                    </a:schemeClr>
+                  </a:outerShdw>
+                </a:effectLst>
+                <a:latin typeface="+mn-lt"/>
+              </a:rPr>
+              <a:t>Beer</a:t>
+            </a:r>
+            <a:r>
+              <a:rPr lang="en-US" sz="1400" dirty="0"/>
+              <a:t> Crafters</a:t>
+            </a:r>
+          </a:p>
+        </p:txBody>
+      </p:sp>
+      <p:sp>
+        <p:nvSpPr>
+          <p:cNvPr id="11" name="Content Placeholder 3">
+            <a:extLst>
+              <a:ext uri="{FF2B5EF4-FFF2-40B4-BE49-F238E27FC236}">
+                <a16:creationId xmlns:a16="http://schemas.microsoft.com/office/drawing/2014/main" id="{CE3A1B9C-CE56-41C4-BA7D-B1855548306D}"/>
+              </a:ext>
+            </a:extLst>
+          </p:cNvPr>
+          <p:cNvSpPr txBox="1">
+            <a:spLocks/>
+          </p:cNvSpPr>
+          <p:nvPr/>
+        </p:nvSpPr>
+        <p:spPr>
+          <a:xfrm>
+            <a:off x="2984120" y="2618816"/>
+            <a:ext cx="4368815" cy="502189"/>
+          </a:xfrm>
+          <a:prstGeom prst="rect">
+            <a:avLst/>
+          </a:prstGeom>
+        </p:spPr>
+        <p:txBody>
+          <a:bodyPr vert="horz" lIns="0" tIns="0" rIns="0" bIns="0" rtlCol="0">
+            <a:noAutofit/>
+          </a:bodyPr>
+          <a:lstStyle>
+            <a:lvl1pPr marL="263525" indent="-263525" algn="l" defTabSz="914400" rtl="0" eaLnBrk="1" latinLnBrk="0" hangingPunct="1">
+              <a:lnSpc>
+                <a:spcPct val="90000"/>
+              </a:lnSpc>
+              <a:spcBef>
+                <a:spcPts val="1000"/>
+              </a:spcBef>
+              <a:buFont typeface="Arial" panose="020B0604020202020204" pitchFamily="34" charset="0"/>
+              <a:buChar char="•"/>
+              <a:defRPr sz="1800" kern="1200">
+                <a:solidFill>
+                  <a:schemeClr val="tx1">
+                    <a:lumMod val="75000"/>
+                    <a:lumOff val="25000"/>
+                  </a:schemeClr>
+                </a:solidFill>
+                <a:latin typeface="+mj-lt"/>
+                <a:ea typeface="+mn-ea"/>
+                <a:cs typeface="+mn-cs"/>
+              </a:defRPr>
+            </a:lvl1pPr>
+            <a:lvl2pPr marL="536575" indent="-273050" algn="l" defTabSz="914400" rtl="0" eaLnBrk="1" latinLnBrk="0" hangingPunct="1">
+              <a:lnSpc>
+                <a:spcPct val="90000"/>
+              </a:lnSpc>
+              <a:spcBef>
+                <a:spcPts val="500"/>
+              </a:spcBef>
+              <a:buFont typeface="Arial" panose="020B0604020202020204" pitchFamily="34" charset="0"/>
+              <a:buChar char="•"/>
+              <a:defRPr sz="1600" kern="1200">
+                <a:solidFill>
+                  <a:schemeClr val="tx1">
+                    <a:lumMod val="75000"/>
+                    <a:lumOff val="25000"/>
+                  </a:schemeClr>
+                </a:solidFill>
+                <a:latin typeface="+mj-lt"/>
+                <a:ea typeface="+mn-ea"/>
+                <a:cs typeface="+mn-cs"/>
+              </a:defRPr>
+            </a:lvl2pPr>
+            <a:lvl3pPr marL="811213" indent="-274638" algn="l" defTabSz="914400" rtl="0" eaLnBrk="1" latinLnBrk="0" hangingPunct="1">
+              <a:lnSpc>
+                <a:spcPct val="90000"/>
+              </a:lnSpc>
+              <a:spcBef>
+                <a:spcPts val="500"/>
+              </a:spcBef>
+              <a:buFont typeface="Arial" panose="020B0604020202020204" pitchFamily="34" charset="0"/>
+              <a:buChar char="•"/>
+              <a:defRPr sz="1400" kern="1200">
+                <a:solidFill>
+                  <a:schemeClr val="tx1">
+                    <a:lumMod val="75000"/>
+                    <a:lumOff val="25000"/>
+                  </a:schemeClr>
+                </a:solidFill>
+                <a:latin typeface="+mj-lt"/>
+                <a:ea typeface="+mn-ea"/>
+                <a:cs typeface="+mn-cs"/>
+              </a:defRPr>
+            </a:lvl3pPr>
+            <a:lvl4pPr marL="1074738" indent="-263525" algn="l" defTabSz="914400" rtl="0" eaLnBrk="1" latinLnBrk="0" hangingPunct="1">
+              <a:lnSpc>
+                <a:spcPct val="90000"/>
+              </a:lnSpc>
+              <a:spcBef>
+                <a:spcPts val="500"/>
+              </a:spcBef>
+              <a:buFont typeface="Arial" panose="020B0604020202020204" pitchFamily="34" charset="0"/>
+              <a:buChar char="•"/>
+              <a:defRPr sz="1400" kern="1200">
+                <a:solidFill>
+                  <a:schemeClr val="tx1">
+                    <a:lumMod val="75000"/>
+                    <a:lumOff val="25000"/>
+                  </a:schemeClr>
+                </a:solidFill>
+                <a:latin typeface="+mj-lt"/>
+                <a:ea typeface="+mn-ea"/>
+                <a:cs typeface="+mn-cs"/>
+              </a:defRPr>
+            </a:lvl4pPr>
+            <a:lvl5pPr marL="1347788" indent="-273050" algn="l" defTabSz="914400" rtl="0" eaLnBrk="1" latinLnBrk="0" hangingPunct="1">
+              <a:lnSpc>
+                <a:spcPct val="90000"/>
+              </a:lnSpc>
+              <a:spcBef>
+                <a:spcPts val="500"/>
+              </a:spcBef>
+              <a:buFont typeface="Arial" panose="020B0604020202020204" pitchFamily="34" charset="0"/>
+              <a:buChar char="•"/>
+              <a:defRPr sz="1400" kern="1200">
+                <a:solidFill>
+                  <a:schemeClr val="tx1">
+                    <a:lumMod val="75000"/>
+                    <a:lumOff val="25000"/>
+                  </a:schemeClr>
+                </a:solidFill>
+                <a:latin typeface="+mj-lt"/>
+                <a:ea typeface="+mn-ea"/>
+                <a:cs typeface="+mn-cs"/>
+              </a:defRPr>
+            </a:lvl5pPr>
+            <a:lvl6pPr marL="2514600" indent="-228600" algn="l" defTabSz="914400" rtl="0" eaLnBrk="1" latinLnBrk="0" hangingPunct="1">
+              <a:lnSpc>
+                <a:spcPct val="90000"/>
+              </a:lnSpc>
+              <a:spcBef>
+                <a:spcPts val="500"/>
+              </a:spcBef>
+              <a:buFont typeface="Arial" panose="020B0604020202020204" pitchFamily="34" charset="0"/>
+              <a:buChar char="•"/>
+              <a:defRPr sz="1800" kern="1200">
+                <a:solidFill>
+                  <a:schemeClr val="tx1"/>
+                </a:solidFill>
+                <a:latin typeface="+mn-lt"/>
+                <a:ea typeface="+mn-ea"/>
+                <a:cs typeface="+mn-cs"/>
+              </a:defRPr>
+            </a:lvl6pPr>
+            <a:lvl7pPr marL="2971800" indent="-228600" algn="l" defTabSz="914400" rtl="0" eaLnBrk="1" latinLnBrk="0" hangingPunct="1">
+              <a:lnSpc>
+                <a:spcPct val="90000"/>
+              </a:lnSpc>
+              <a:spcBef>
+                <a:spcPts val="500"/>
+              </a:spcBef>
+              <a:buFont typeface="Arial" panose="020B0604020202020204" pitchFamily="34" charset="0"/>
+              <a:buChar char="•"/>
+              <a:defRPr sz="1800" kern="1200">
+                <a:solidFill>
+                  <a:schemeClr val="tx1"/>
+                </a:solidFill>
+                <a:latin typeface="+mn-lt"/>
+                <a:ea typeface="+mn-ea"/>
+                <a:cs typeface="+mn-cs"/>
+              </a:defRPr>
+            </a:lvl7pPr>
+            <a:lvl8pPr marL="3429000" indent="-228600" algn="l" defTabSz="914400" rtl="0" eaLnBrk="1" latinLnBrk="0" hangingPunct="1">
+              <a:lnSpc>
+                <a:spcPct val="90000"/>
+              </a:lnSpc>
+              <a:spcBef>
+                <a:spcPts val="500"/>
+              </a:spcBef>
+              <a:buFont typeface="Arial" panose="020B0604020202020204" pitchFamily="34" charset="0"/>
+              <a:buChar char="•"/>
+              <a:defRPr sz="1800" kern="1200">
+                <a:solidFill>
+                  <a:schemeClr val="tx1"/>
+                </a:solidFill>
+                <a:latin typeface="+mn-lt"/>
+                <a:ea typeface="+mn-ea"/>
+                <a:cs typeface="+mn-cs"/>
+              </a:defRPr>
+            </a:lvl8pPr>
+            <a:lvl9pPr marL="3886200" indent="-228600" algn="l" defTabSz="914400" rtl="0" eaLnBrk="1" latinLnBrk="0" hangingPunct="1">
+              <a:lnSpc>
+                <a:spcPct val="90000"/>
+              </a:lnSpc>
+              <a:spcBef>
+                <a:spcPts val="500"/>
+              </a:spcBef>
+              <a:buFont typeface="Arial" panose="020B0604020202020204" pitchFamily="34" charset="0"/>
+              <a:buChar char="•"/>
+              <a:defRPr sz="1800" kern="1200">
+                <a:solidFill>
+                  <a:schemeClr val="tx1"/>
+                </a:solidFill>
+                <a:latin typeface="+mn-lt"/>
+                <a:ea typeface="+mn-ea"/>
+                <a:cs typeface="+mn-cs"/>
+              </a:defRPr>
+            </a:lvl9pPr>
+          </a:lstStyle>
+          <a:p>
+            <a:pPr marL="0" indent="0">
+              <a:buNone/>
+            </a:pPr>
+            <a:r>
+              <a:rPr lang="en-US" sz="1600" b="1" u="sng" dirty="0">
+                <a:ln>
+                  <a:solidFill>
+                    <a:schemeClr val="bg1">
+                      <a:lumMod val="75000"/>
+                      <a:lumOff val="25000"/>
+                      <a:alpha val="10000"/>
+                    </a:schemeClr>
+                  </a:solidFill>
+                </a:ln>
+                <a:solidFill>
+                  <a:schemeClr val="tx2"/>
+                </a:solidFill>
+                <a:effectLst>
+                  <a:outerShdw blurRad="9525" dist="25400" dir="14640000" algn="tl" rotWithShape="0">
+                    <a:schemeClr val="bg1">
+                      <a:alpha val="30000"/>
+                    </a:schemeClr>
+                  </a:outerShdw>
+                </a:effectLst>
+                <a:latin typeface="+mn-lt"/>
+              </a:rPr>
+              <a:t>Request</a:t>
+            </a:r>
+            <a:r>
+              <a:rPr lang="en-US" sz="1600" dirty="0">
+                <a:ln>
+                  <a:solidFill>
+                    <a:schemeClr val="bg1">
+                      <a:lumMod val="75000"/>
+                      <a:lumOff val="25000"/>
+                      <a:alpha val="10000"/>
+                    </a:schemeClr>
+                  </a:solidFill>
+                </a:ln>
+                <a:solidFill>
+                  <a:schemeClr val="tx2"/>
+                </a:solidFill>
+                <a:effectLst>
+                  <a:outerShdw blurRad="9525" dist="25400" dir="14640000" algn="tl" rotWithShape="0">
+                    <a:schemeClr val="bg1">
+                      <a:alpha val="30000"/>
+                    </a:schemeClr>
+                  </a:outerShdw>
+                </a:effectLst>
+                <a:latin typeface="+mn-lt"/>
+              </a:rPr>
+              <a:t>: Perform a analysis to help client decide where to start a new beer crafting factory</a:t>
+            </a:r>
+          </a:p>
+        </p:txBody>
+      </p:sp>
+      <p:sp>
+        <p:nvSpPr>
+          <p:cNvPr id="12" name="Content Placeholder 3">
+            <a:extLst>
+              <a:ext uri="{FF2B5EF4-FFF2-40B4-BE49-F238E27FC236}">
+                <a16:creationId xmlns:a16="http://schemas.microsoft.com/office/drawing/2014/main" id="{D7EF49EB-81D8-4FAD-88A5-D4CF96125E9A}"/>
+              </a:ext>
+            </a:extLst>
+          </p:cNvPr>
+          <p:cNvSpPr txBox="1">
+            <a:spLocks/>
+          </p:cNvSpPr>
+          <p:nvPr/>
+        </p:nvSpPr>
+        <p:spPr>
+          <a:xfrm>
+            <a:off x="360000" y="3346109"/>
+            <a:ext cx="6867988" cy="502189"/>
+          </a:xfrm>
+          <a:prstGeom prst="rect">
+            <a:avLst/>
+          </a:prstGeom>
+        </p:spPr>
+        <p:txBody>
+          <a:bodyPr vert="horz" lIns="0" tIns="0" rIns="0" bIns="0" rtlCol="0">
+            <a:noAutofit/>
+          </a:bodyPr>
+          <a:lstStyle>
+            <a:lvl1pPr marL="263525" indent="-263525" algn="l" defTabSz="914400" rtl="0" eaLnBrk="1" latinLnBrk="0" hangingPunct="1">
+              <a:lnSpc>
+                <a:spcPct val="90000"/>
+              </a:lnSpc>
+              <a:spcBef>
+                <a:spcPts val="1000"/>
+              </a:spcBef>
+              <a:buFont typeface="Arial" panose="020B0604020202020204" pitchFamily="34" charset="0"/>
+              <a:buChar char="•"/>
+              <a:defRPr sz="1800" kern="1200">
+                <a:solidFill>
+                  <a:schemeClr val="tx1">
+                    <a:lumMod val="75000"/>
+                    <a:lumOff val="25000"/>
+                  </a:schemeClr>
+                </a:solidFill>
+                <a:latin typeface="+mj-lt"/>
+                <a:ea typeface="+mn-ea"/>
+                <a:cs typeface="+mn-cs"/>
+              </a:defRPr>
+            </a:lvl1pPr>
+            <a:lvl2pPr marL="536575" indent="-273050" algn="l" defTabSz="914400" rtl="0" eaLnBrk="1" latinLnBrk="0" hangingPunct="1">
+              <a:lnSpc>
+                <a:spcPct val="90000"/>
+              </a:lnSpc>
+              <a:spcBef>
+                <a:spcPts val="500"/>
+              </a:spcBef>
+              <a:buFont typeface="Arial" panose="020B0604020202020204" pitchFamily="34" charset="0"/>
+              <a:buChar char="•"/>
+              <a:defRPr sz="1600" kern="1200">
+                <a:solidFill>
+                  <a:schemeClr val="tx1">
+                    <a:lumMod val="75000"/>
+                    <a:lumOff val="25000"/>
+                  </a:schemeClr>
+                </a:solidFill>
+                <a:latin typeface="+mj-lt"/>
+                <a:ea typeface="+mn-ea"/>
+                <a:cs typeface="+mn-cs"/>
+              </a:defRPr>
+            </a:lvl2pPr>
+            <a:lvl3pPr marL="811213" indent="-274638" algn="l" defTabSz="914400" rtl="0" eaLnBrk="1" latinLnBrk="0" hangingPunct="1">
+              <a:lnSpc>
+                <a:spcPct val="90000"/>
+              </a:lnSpc>
+              <a:spcBef>
+                <a:spcPts val="500"/>
+              </a:spcBef>
+              <a:buFont typeface="Arial" panose="020B0604020202020204" pitchFamily="34" charset="0"/>
+              <a:buChar char="•"/>
+              <a:defRPr sz="1400" kern="1200">
+                <a:solidFill>
+                  <a:schemeClr val="tx1">
+                    <a:lumMod val="75000"/>
+                    <a:lumOff val="25000"/>
+                  </a:schemeClr>
+                </a:solidFill>
+                <a:latin typeface="+mj-lt"/>
+                <a:ea typeface="+mn-ea"/>
+                <a:cs typeface="+mn-cs"/>
+              </a:defRPr>
+            </a:lvl3pPr>
+            <a:lvl4pPr marL="1074738" indent="-263525" algn="l" defTabSz="914400" rtl="0" eaLnBrk="1" latinLnBrk="0" hangingPunct="1">
+              <a:lnSpc>
+                <a:spcPct val="90000"/>
+              </a:lnSpc>
+              <a:spcBef>
+                <a:spcPts val="500"/>
+              </a:spcBef>
+              <a:buFont typeface="Arial" panose="020B0604020202020204" pitchFamily="34" charset="0"/>
+              <a:buChar char="•"/>
+              <a:defRPr sz="1400" kern="1200">
+                <a:solidFill>
+                  <a:schemeClr val="tx1">
+                    <a:lumMod val="75000"/>
+                    <a:lumOff val="25000"/>
+                  </a:schemeClr>
+                </a:solidFill>
+                <a:latin typeface="+mj-lt"/>
+                <a:ea typeface="+mn-ea"/>
+                <a:cs typeface="+mn-cs"/>
+              </a:defRPr>
+            </a:lvl4pPr>
+            <a:lvl5pPr marL="1347788" indent="-273050" algn="l" defTabSz="914400" rtl="0" eaLnBrk="1" latinLnBrk="0" hangingPunct="1">
+              <a:lnSpc>
+                <a:spcPct val="90000"/>
+              </a:lnSpc>
+              <a:spcBef>
+                <a:spcPts val="500"/>
+              </a:spcBef>
+              <a:buFont typeface="Arial" panose="020B0604020202020204" pitchFamily="34" charset="0"/>
+              <a:buChar char="•"/>
+              <a:defRPr sz="1400" kern="1200">
+                <a:solidFill>
+                  <a:schemeClr val="tx1">
+                    <a:lumMod val="75000"/>
+                    <a:lumOff val="25000"/>
+                  </a:schemeClr>
+                </a:solidFill>
+                <a:latin typeface="+mj-lt"/>
+                <a:ea typeface="+mn-ea"/>
+                <a:cs typeface="+mn-cs"/>
+              </a:defRPr>
+            </a:lvl5pPr>
+            <a:lvl6pPr marL="2514600" indent="-228600" algn="l" defTabSz="914400" rtl="0" eaLnBrk="1" latinLnBrk="0" hangingPunct="1">
+              <a:lnSpc>
+                <a:spcPct val="90000"/>
+              </a:lnSpc>
+              <a:spcBef>
+                <a:spcPts val="500"/>
+              </a:spcBef>
+              <a:buFont typeface="Arial" panose="020B0604020202020204" pitchFamily="34" charset="0"/>
+              <a:buChar char="•"/>
+              <a:defRPr sz="1800" kern="1200">
+                <a:solidFill>
+                  <a:schemeClr val="tx1"/>
+                </a:solidFill>
+                <a:latin typeface="+mn-lt"/>
+                <a:ea typeface="+mn-ea"/>
+                <a:cs typeface="+mn-cs"/>
+              </a:defRPr>
+            </a:lvl6pPr>
+            <a:lvl7pPr marL="2971800" indent="-228600" algn="l" defTabSz="914400" rtl="0" eaLnBrk="1" latinLnBrk="0" hangingPunct="1">
+              <a:lnSpc>
+                <a:spcPct val="90000"/>
+              </a:lnSpc>
+              <a:spcBef>
+                <a:spcPts val="500"/>
+              </a:spcBef>
+              <a:buFont typeface="Arial" panose="020B0604020202020204" pitchFamily="34" charset="0"/>
+              <a:buChar char="•"/>
+              <a:defRPr sz="1800" kern="1200">
+                <a:solidFill>
+                  <a:schemeClr val="tx1"/>
+                </a:solidFill>
+                <a:latin typeface="+mn-lt"/>
+                <a:ea typeface="+mn-ea"/>
+                <a:cs typeface="+mn-cs"/>
+              </a:defRPr>
+            </a:lvl7pPr>
+            <a:lvl8pPr marL="3429000" indent="-228600" algn="l" defTabSz="914400" rtl="0" eaLnBrk="1" latinLnBrk="0" hangingPunct="1">
+              <a:lnSpc>
+                <a:spcPct val="90000"/>
+              </a:lnSpc>
+              <a:spcBef>
+                <a:spcPts val="500"/>
+              </a:spcBef>
+              <a:buFont typeface="Arial" panose="020B0604020202020204" pitchFamily="34" charset="0"/>
+              <a:buChar char="•"/>
+              <a:defRPr sz="1800" kern="1200">
+                <a:solidFill>
+                  <a:schemeClr val="tx1"/>
+                </a:solidFill>
+                <a:latin typeface="+mn-lt"/>
+                <a:ea typeface="+mn-ea"/>
+                <a:cs typeface="+mn-cs"/>
+              </a:defRPr>
+            </a:lvl8pPr>
+            <a:lvl9pPr marL="3886200" indent="-228600" algn="l" defTabSz="914400" rtl="0" eaLnBrk="1" latinLnBrk="0" hangingPunct="1">
+              <a:lnSpc>
+                <a:spcPct val="90000"/>
+              </a:lnSpc>
+              <a:spcBef>
+                <a:spcPts val="500"/>
+              </a:spcBef>
+              <a:buFont typeface="Arial" panose="020B0604020202020204" pitchFamily="34" charset="0"/>
+              <a:buChar char="•"/>
+              <a:defRPr sz="1800" kern="1200">
+                <a:solidFill>
+                  <a:schemeClr val="tx1"/>
+                </a:solidFill>
+                <a:latin typeface="+mn-lt"/>
+                <a:ea typeface="+mn-ea"/>
+                <a:cs typeface="+mn-cs"/>
+              </a:defRPr>
+            </a:lvl9pPr>
+          </a:lstStyle>
+          <a:p>
+            <a:pPr marL="0" indent="0">
+              <a:buNone/>
+            </a:pPr>
+            <a:r>
+              <a:rPr lang="en-US" sz="1600" b="1" u="sng" dirty="0">
+                <a:ln>
+                  <a:solidFill>
+                    <a:schemeClr val="bg1">
+                      <a:lumMod val="75000"/>
+                      <a:lumOff val="25000"/>
+                      <a:alpha val="10000"/>
+                    </a:schemeClr>
+                  </a:solidFill>
+                </a:ln>
+                <a:solidFill>
+                  <a:schemeClr val="tx2"/>
+                </a:solidFill>
+                <a:effectLst>
+                  <a:outerShdw blurRad="9525" dist="25400" dir="14640000" algn="tl" rotWithShape="0">
+                    <a:schemeClr val="bg1">
+                      <a:alpha val="30000"/>
+                    </a:schemeClr>
+                  </a:outerShdw>
+                </a:effectLst>
+                <a:latin typeface="+mn-lt"/>
+              </a:rPr>
+              <a:t>Strategic Impact</a:t>
+            </a:r>
+            <a:r>
+              <a:rPr lang="en-US" sz="1600" dirty="0">
+                <a:ln>
+                  <a:solidFill>
+                    <a:schemeClr val="bg1">
+                      <a:lumMod val="75000"/>
+                      <a:lumOff val="25000"/>
+                      <a:alpha val="10000"/>
+                    </a:schemeClr>
+                  </a:solidFill>
+                </a:ln>
+                <a:solidFill>
+                  <a:schemeClr val="tx2"/>
+                </a:solidFill>
+                <a:effectLst>
+                  <a:outerShdw blurRad="9525" dist="25400" dir="14640000" algn="tl" rotWithShape="0">
+                    <a:schemeClr val="bg1">
+                      <a:alpha val="30000"/>
+                    </a:schemeClr>
+                  </a:outerShdw>
+                </a:effectLst>
+                <a:latin typeface="+mn-lt"/>
+              </a:rPr>
+              <a:t>: Starting new beer factory to serve remote areas with better ROI</a:t>
+            </a:r>
+          </a:p>
+        </p:txBody>
+      </p:sp>
+      <p:sp>
+        <p:nvSpPr>
+          <p:cNvPr id="13" name="Content Placeholder 3">
+            <a:extLst>
+              <a:ext uri="{FF2B5EF4-FFF2-40B4-BE49-F238E27FC236}">
+                <a16:creationId xmlns:a16="http://schemas.microsoft.com/office/drawing/2014/main" id="{DF4889B0-98E7-4F65-BE27-7F51FDDB3F42}"/>
+              </a:ext>
+            </a:extLst>
+          </p:cNvPr>
+          <p:cNvSpPr txBox="1">
+            <a:spLocks/>
+          </p:cNvSpPr>
+          <p:nvPr/>
+        </p:nvSpPr>
+        <p:spPr>
+          <a:xfrm>
+            <a:off x="3184150" y="3954159"/>
+            <a:ext cx="1442604" cy="379908"/>
+          </a:xfrm>
+          <a:prstGeom prst="rect">
+            <a:avLst/>
+          </a:prstGeom>
+        </p:spPr>
+        <p:txBody>
+          <a:bodyPr vert="horz" lIns="0" tIns="0" rIns="0" bIns="0" rtlCol="0">
+            <a:noAutofit/>
+          </a:bodyPr>
+          <a:lstStyle>
+            <a:lvl1pPr marL="263525" indent="-263525" algn="l" defTabSz="914400" rtl="0" eaLnBrk="1" latinLnBrk="0" hangingPunct="1">
+              <a:lnSpc>
+                <a:spcPct val="90000"/>
+              </a:lnSpc>
+              <a:spcBef>
+                <a:spcPts val="1000"/>
+              </a:spcBef>
+              <a:buFont typeface="Arial" panose="020B0604020202020204" pitchFamily="34" charset="0"/>
+              <a:buChar char="•"/>
+              <a:defRPr sz="1800" kern="1200">
+                <a:solidFill>
+                  <a:schemeClr val="tx1">
+                    <a:lumMod val="75000"/>
+                    <a:lumOff val="25000"/>
+                  </a:schemeClr>
+                </a:solidFill>
+                <a:latin typeface="+mj-lt"/>
+                <a:ea typeface="+mn-ea"/>
+                <a:cs typeface="+mn-cs"/>
+              </a:defRPr>
+            </a:lvl1pPr>
+            <a:lvl2pPr marL="536575" indent="-273050" algn="l" defTabSz="914400" rtl="0" eaLnBrk="1" latinLnBrk="0" hangingPunct="1">
+              <a:lnSpc>
+                <a:spcPct val="90000"/>
+              </a:lnSpc>
+              <a:spcBef>
+                <a:spcPts val="500"/>
+              </a:spcBef>
+              <a:buFont typeface="Arial" panose="020B0604020202020204" pitchFamily="34" charset="0"/>
+              <a:buChar char="•"/>
+              <a:defRPr sz="1600" kern="1200">
+                <a:solidFill>
+                  <a:schemeClr val="tx1">
+                    <a:lumMod val="75000"/>
+                    <a:lumOff val="25000"/>
+                  </a:schemeClr>
+                </a:solidFill>
+                <a:latin typeface="+mj-lt"/>
+                <a:ea typeface="+mn-ea"/>
+                <a:cs typeface="+mn-cs"/>
+              </a:defRPr>
+            </a:lvl2pPr>
+            <a:lvl3pPr marL="811213" indent="-274638" algn="l" defTabSz="914400" rtl="0" eaLnBrk="1" latinLnBrk="0" hangingPunct="1">
+              <a:lnSpc>
+                <a:spcPct val="90000"/>
+              </a:lnSpc>
+              <a:spcBef>
+                <a:spcPts val="500"/>
+              </a:spcBef>
+              <a:buFont typeface="Arial" panose="020B0604020202020204" pitchFamily="34" charset="0"/>
+              <a:buChar char="•"/>
+              <a:defRPr sz="1400" kern="1200">
+                <a:solidFill>
+                  <a:schemeClr val="tx1">
+                    <a:lumMod val="75000"/>
+                    <a:lumOff val="25000"/>
+                  </a:schemeClr>
+                </a:solidFill>
+                <a:latin typeface="+mj-lt"/>
+                <a:ea typeface="+mn-ea"/>
+                <a:cs typeface="+mn-cs"/>
+              </a:defRPr>
+            </a:lvl3pPr>
+            <a:lvl4pPr marL="1074738" indent="-263525" algn="l" defTabSz="914400" rtl="0" eaLnBrk="1" latinLnBrk="0" hangingPunct="1">
+              <a:lnSpc>
+                <a:spcPct val="90000"/>
+              </a:lnSpc>
+              <a:spcBef>
+                <a:spcPts val="500"/>
+              </a:spcBef>
+              <a:buFont typeface="Arial" panose="020B0604020202020204" pitchFamily="34" charset="0"/>
+              <a:buChar char="•"/>
+              <a:defRPr sz="1400" kern="1200">
+                <a:solidFill>
+                  <a:schemeClr val="tx1">
+                    <a:lumMod val="75000"/>
+                    <a:lumOff val="25000"/>
+                  </a:schemeClr>
+                </a:solidFill>
+                <a:latin typeface="+mj-lt"/>
+                <a:ea typeface="+mn-ea"/>
+                <a:cs typeface="+mn-cs"/>
+              </a:defRPr>
+            </a:lvl4pPr>
+            <a:lvl5pPr marL="1347788" indent="-273050" algn="l" defTabSz="914400" rtl="0" eaLnBrk="1" latinLnBrk="0" hangingPunct="1">
+              <a:lnSpc>
+                <a:spcPct val="90000"/>
+              </a:lnSpc>
+              <a:spcBef>
+                <a:spcPts val="500"/>
+              </a:spcBef>
+              <a:buFont typeface="Arial" panose="020B0604020202020204" pitchFamily="34" charset="0"/>
+              <a:buChar char="•"/>
+              <a:defRPr sz="1400" kern="1200">
+                <a:solidFill>
+                  <a:schemeClr val="tx1">
+                    <a:lumMod val="75000"/>
+                    <a:lumOff val="25000"/>
+                  </a:schemeClr>
+                </a:solidFill>
+                <a:latin typeface="+mj-lt"/>
+                <a:ea typeface="+mn-ea"/>
+                <a:cs typeface="+mn-cs"/>
+              </a:defRPr>
+            </a:lvl5pPr>
+            <a:lvl6pPr marL="2514600" indent="-228600" algn="l" defTabSz="914400" rtl="0" eaLnBrk="1" latinLnBrk="0" hangingPunct="1">
+              <a:lnSpc>
+                <a:spcPct val="90000"/>
+              </a:lnSpc>
+              <a:spcBef>
+                <a:spcPts val="500"/>
+              </a:spcBef>
+              <a:buFont typeface="Arial" panose="020B0604020202020204" pitchFamily="34" charset="0"/>
+              <a:buChar char="•"/>
+              <a:defRPr sz="1800" kern="1200">
+                <a:solidFill>
+                  <a:schemeClr val="tx1"/>
+                </a:solidFill>
+                <a:latin typeface="+mn-lt"/>
+                <a:ea typeface="+mn-ea"/>
+                <a:cs typeface="+mn-cs"/>
+              </a:defRPr>
+            </a:lvl6pPr>
+            <a:lvl7pPr marL="2971800" indent="-228600" algn="l" defTabSz="914400" rtl="0" eaLnBrk="1" latinLnBrk="0" hangingPunct="1">
+              <a:lnSpc>
+                <a:spcPct val="90000"/>
+              </a:lnSpc>
+              <a:spcBef>
+                <a:spcPts val="500"/>
+              </a:spcBef>
+              <a:buFont typeface="Arial" panose="020B0604020202020204" pitchFamily="34" charset="0"/>
+              <a:buChar char="•"/>
+              <a:defRPr sz="1800" kern="1200">
+                <a:solidFill>
+                  <a:schemeClr val="tx1"/>
+                </a:solidFill>
+                <a:latin typeface="+mn-lt"/>
+                <a:ea typeface="+mn-ea"/>
+                <a:cs typeface="+mn-cs"/>
+              </a:defRPr>
+            </a:lvl7pPr>
+            <a:lvl8pPr marL="3429000" indent="-228600" algn="l" defTabSz="914400" rtl="0" eaLnBrk="1" latinLnBrk="0" hangingPunct="1">
+              <a:lnSpc>
+                <a:spcPct val="90000"/>
+              </a:lnSpc>
+              <a:spcBef>
+                <a:spcPts val="500"/>
+              </a:spcBef>
+              <a:buFont typeface="Arial" panose="020B0604020202020204" pitchFamily="34" charset="0"/>
+              <a:buChar char="•"/>
+              <a:defRPr sz="1800" kern="1200">
+                <a:solidFill>
+                  <a:schemeClr val="tx1"/>
+                </a:solidFill>
+                <a:latin typeface="+mn-lt"/>
+                <a:ea typeface="+mn-ea"/>
+                <a:cs typeface="+mn-cs"/>
+              </a:defRPr>
+            </a:lvl8pPr>
+            <a:lvl9pPr marL="3886200" indent="-228600" algn="l" defTabSz="914400" rtl="0" eaLnBrk="1" latinLnBrk="0" hangingPunct="1">
+              <a:lnSpc>
+                <a:spcPct val="90000"/>
+              </a:lnSpc>
+              <a:spcBef>
+                <a:spcPts val="500"/>
+              </a:spcBef>
+              <a:buFont typeface="Arial" panose="020B0604020202020204" pitchFamily="34" charset="0"/>
+              <a:buChar char="•"/>
+              <a:defRPr sz="1800" kern="1200">
+                <a:solidFill>
+                  <a:schemeClr val="tx1"/>
+                </a:solidFill>
+                <a:latin typeface="+mn-lt"/>
+                <a:ea typeface="+mn-ea"/>
+                <a:cs typeface="+mn-cs"/>
+              </a:defRPr>
+            </a:lvl9pPr>
+          </a:lstStyle>
+          <a:p>
+            <a:pPr marL="0" indent="0" algn="ctr">
+              <a:buNone/>
+            </a:pPr>
+            <a:r>
+              <a:rPr lang="en-US" sz="1600" b="1" dirty="0">
+                <a:ln>
+                  <a:solidFill>
+                    <a:schemeClr val="bg1">
+                      <a:lumMod val="75000"/>
+                      <a:lumOff val="25000"/>
+                      <a:alpha val="10000"/>
+                    </a:schemeClr>
+                  </a:solidFill>
+                </a:ln>
+                <a:solidFill>
+                  <a:schemeClr val="tx2"/>
+                </a:solidFill>
+                <a:effectLst>
+                  <a:outerShdw blurRad="9525" dist="25400" dir="14640000" algn="tl" rotWithShape="0">
+                    <a:schemeClr val="bg1">
+                      <a:alpha val="30000"/>
+                    </a:schemeClr>
+                  </a:outerShdw>
+                </a:effectLst>
+                <a:latin typeface="+mn-lt"/>
+              </a:rPr>
+              <a:t>Data Snapshot</a:t>
+            </a:r>
+            <a:endParaRPr lang="en-US" sz="1600" dirty="0">
+              <a:ln>
+                <a:solidFill>
+                  <a:schemeClr val="bg1">
+                    <a:lumMod val="75000"/>
+                    <a:lumOff val="25000"/>
+                    <a:alpha val="10000"/>
+                  </a:schemeClr>
+                </a:solidFill>
+              </a:ln>
+              <a:solidFill>
+                <a:schemeClr val="tx2"/>
+              </a:solidFill>
+              <a:effectLst>
+                <a:outerShdw blurRad="9525" dist="25400" dir="14640000" algn="tl" rotWithShape="0">
+                  <a:schemeClr val="bg1">
+                    <a:alpha val="30000"/>
+                  </a:schemeClr>
+                </a:outerShdw>
+              </a:effectLst>
+              <a:latin typeface="+mn-lt"/>
+            </a:endParaRPr>
+          </a:p>
+        </p:txBody>
+      </p:sp>
+      <p:sp>
+        <p:nvSpPr>
+          <p:cNvPr id="6" name="Rectangle 5">
+            <a:extLst>
+              <a:ext uri="{FF2B5EF4-FFF2-40B4-BE49-F238E27FC236}">
+                <a16:creationId xmlns:a16="http://schemas.microsoft.com/office/drawing/2014/main" id="{EC519C47-2F04-4070-A9B9-D9B1A04F03E5}"/>
+              </a:ext>
+            </a:extLst>
+          </p:cNvPr>
+          <p:cNvSpPr/>
+          <p:nvPr/>
+        </p:nvSpPr>
+        <p:spPr>
+          <a:xfrm>
+            <a:off x="317576" y="3848298"/>
+            <a:ext cx="7353528" cy="2624117"/>
+          </a:xfrm>
+          <a:prstGeom prst="rect">
+            <a:avLst/>
+          </a:prstGeom>
+          <a:noFill/>
+          <a:ln w="3175" cap="flat" cmpd="sng" algn="ctr">
+            <a:solidFill>
+              <a:schemeClr val="tx1"/>
+            </a:solidFill>
+            <a:prstDash val="solid"/>
+            <a:round/>
+            <a:headEnd type="none" w="med" len="med"/>
+            <a:tailEnd type="none" w="med" len="med"/>
+          </a:ln>
+        </p:spPr>
+        <p:style>
+          <a:lnRef idx="0">
+            <a:scrgbClr r="0" g="0" b="0"/>
+          </a:lnRef>
+          <a:fillRef idx="0">
+            <a:scrgbClr r="0" g="0" b="0"/>
+          </a:fillRef>
+          <a:effectRef idx="0">
+            <a:scrgbClr r="0" g="0" b="0"/>
+          </a:effectRef>
+          <a:fontRef idx="minor">
+            <a:schemeClr val="accent5"/>
+          </a:fontRef>
+        </p:style>
+        <p:txBody>
+          <a:bodyPr rtlCol="0" anchor="ctr"/>
+          <a:lstStyle/>
+          <a:p>
+            <a:pPr algn="ctr"/>
+            <a:endParaRPr lang="en-US"/>
           </a:p>
         </p:txBody>
       </p:sp>
@@ -17563,7 +18688,7 @@
         <p:spPr>
           <a:xfrm>
             <a:off x="621102" y="1276709"/>
-            <a:ext cx="10973298" cy="646331"/>
+            <a:ext cx="10973298" cy="369332"/>
           </a:xfrm>
           <a:prstGeom prst="rect">
             <a:avLst/>
@@ -17578,7 +18703,7 @@
           <a:p>
             <a:r>
               <a:rPr lang="en-US" dirty="0"/>
-              <a:t>Beers and Breweries data have be de-normalized into one set for further investigation into the data</a:t>
+              <a:t>Beers and Breweries data have been de-normalized into one set for further investigation into the data</a:t>
             </a:r>
           </a:p>
         </p:txBody>
@@ -20466,14 +21591,14 @@
           <p:nvPr>
             <p:extLst>
               <p:ext uri="{D42A27DB-BD31-4B8C-83A1-F6EECF244321}">
-                <p14:modId xmlns:p14="http://schemas.microsoft.com/office/powerpoint/2010/main" val="1328558663"/>
+                <p14:modId xmlns:p14="http://schemas.microsoft.com/office/powerpoint/2010/main" val="2146520197"/>
               </p:ext>
             </p:extLst>
           </p:nvPr>
         </p:nvGraphicFramePr>
         <p:xfrm>
-          <a:off x="276217" y="609600"/>
-          <a:ext cx="11628918" cy="5856213"/>
+          <a:off x="276217" y="2584413"/>
+          <a:ext cx="11628918" cy="3881400"/>
         </p:xfrm>
         <a:graphic>
           <a:graphicData uri="http://schemas.openxmlformats.org/drawingml/2006/chart">
@@ -20481,6 +21606,41 @@
           </a:graphicData>
         </a:graphic>
       </p:graphicFrame>
+      <p:sp>
+        <p:nvSpPr>
+          <p:cNvPr id="4" name="TextBox 3">
+            <a:extLst>
+              <a:ext uri="{FF2B5EF4-FFF2-40B4-BE49-F238E27FC236}">
+                <a16:creationId xmlns:a16="http://schemas.microsoft.com/office/drawing/2014/main" id="{491F18DF-E2F4-479C-9E68-8ECA5CB3E298}"/>
+              </a:ext>
+            </a:extLst>
+          </p:cNvPr>
+          <p:cNvSpPr txBox="1"/>
+          <p:nvPr/>
+        </p:nvSpPr>
+        <p:spPr>
+          <a:xfrm>
+            <a:off x="544446" y="1580050"/>
+            <a:ext cx="10973298" cy="646331"/>
+          </a:xfrm>
+          <a:prstGeom prst="rect">
+            <a:avLst/>
+          </a:prstGeom>
+          <a:noFill/>
+        </p:spPr>
+        <p:txBody>
+          <a:bodyPr wrap="square" rtlCol="0">
+            <a:spAutoFit/>
+          </a:bodyPr>
+          <a:lstStyle/>
+          <a:p>
+            <a:r>
+              <a:rPr lang="en-US" dirty="0"/>
+              <a:t>Median Alcohol by volume helps US Beer crafters to decide what should the concentration of the alcohol in the beers for their new factory.</a:t>
+            </a:r>
+          </a:p>
+        </p:txBody>
+      </p:sp>
     </p:spTree>
     <p:extLst>
       <p:ext uri="{BB962C8B-B14F-4D97-AF65-F5344CB8AC3E}">

</xml_diff>